<commit_message>
repo: update ppt template
</commit_message>
<xml_diff>
--- a/格维开源社区 PPT 模版.pptx
+++ b/格维开源社区 PPT 模版.pptx
@@ -2687,30 +2687,6 @@
           </a:p>
         </p:txBody>
       </p:sp>
-      <p:pic>
-        <p:nvPicPr>
-          <p:cNvPr id="6" name="图片 5"/>
-          <p:cNvPicPr>
-            <a:picLocks noChangeAspect="1"/>
-          </p:cNvPicPr>
-          <p:nvPr/>
-        </p:nvPicPr>
-        <p:blipFill>
-          <a:blip r:embed="rId2"/>
-          <a:stretch>
-            <a:fillRect/>
-          </a:stretch>
-        </p:blipFill>
-        <p:spPr>
-          <a:xfrm>
-            <a:off x="8367326" y="1604888"/>
-            <a:ext cx="3537174" cy="3537174"/>
-          </a:xfrm>
-          <a:prstGeom prst="rect">
-            <a:avLst/>
-          </a:prstGeom>
-        </p:spPr>
-      </p:pic>
       <p:sp>
         <p:nvSpPr>
           <p:cNvPr id="8" name="文本框 7"/>
@@ -2760,7 +2736,19 @@
                 <a:ea typeface="楷体" panose="02010609060101010101" pitchFamily="49" charset="-122"/>
                 <a:cs typeface="楷体" panose="02010609060101010101" pitchFamily="49" charset="-122"/>
               </a:rPr>
-              <a:t>：开源内核安全修炼</a:t>
+              <a:t>：</a:t>
+            </a:r>
+            <a:r>
+              <a:rPr lang="en-US" altLang="zh-CN" sz="1600" b="0" i="0" dirty="0">
+                <a:solidFill>
+                  <a:srgbClr val="353535"/>
+                </a:solidFill>
+                <a:effectLst/>
+                <a:latin typeface="楷体" panose="02010609060101010101" pitchFamily="49" charset="-122"/>
+                <a:ea typeface="楷体" panose="02010609060101010101" pitchFamily="49" charset="-122"/>
+                <a:cs typeface="楷体" panose="02010609060101010101" pitchFamily="49" charset="-122"/>
+              </a:rPr>
+              <a:t>GTOC</a:t>
             </a:r>
             <a:endParaRPr lang="en-US" altLang="zh-CN" sz="1600" b="0" i="0" dirty="0">
               <a:solidFill>
@@ -2809,7 +2797,7 @@
                 <a:ea typeface="楷体" panose="02010609060101010101" pitchFamily="49" charset="-122"/>
                 <a:cs typeface="楷体" panose="02010609060101010101" pitchFamily="49" charset="-122"/>
               </a:rPr>
-              <a:t>kernel_sec_pratice</a:t>
+              <a:t>gevico-vx</a:t>
             </a:r>
             <a:endParaRPr lang="en-US" altLang="zh-CN" sz="1600" dirty="0" err="1">
               <a:solidFill>
@@ -2877,9 +2865,36 @@
               <a:rPr lang="en-US" altLang="zh-CN" sz="1400" b="1">
                 <a:latin typeface="仿宋" panose="02010609060101010101" charset="-122"/>
                 <a:ea typeface="仿宋" panose="02010609060101010101" charset="-122"/>
+                <a:hlinkClick r:id="rId2" action="ppaction://hlinkfile"/>
+              </a:rPr>
+              <a:t>Rust in QEMU roadmap - Paolo Bonzini</a:t>
+            </a:r>
+            <a:endParaRPr lang="en-US" altLang="zh-CN" sz="1400" b="1">
+              <a:latin typeface="仿宋" panose="02010609060101010101" charset="-122"/>
+              <a:ea typeface="仿宋" panose="02010609060101010101" charset="-122"/>
+              <a:hlinkClick r:id="rId2" action="ppaction://hlinkfile"/>
+            </a:endParaRPr>
+          </a:p>
+          <a:p>
+            <a:pPr>
+              <a:lnSpc>
+                <a:spcPct val="130000"/>
+              </a:lnSpc>
+            </a:pPr>
+            <a:r>
+              <a:rPr lang="en-US" altLang="zh-CN" sz="1400" b="1">
+                <a:latin typeface="仿宋" panose="02010609060101010101" charset="-122"/>
+                <a:ea typeface="仿宋" panose="02010609060101010101" charset="-122"/>
+              </a:rPr>
+              <a:t>[2] </a:t>
+            </a:r>
+            <a:r>
+              <a:rPr lang="en-US" altLang="zh-CN" sz="1400" b="1">
+                <a:latin typeface="仿宋" panose="02010609060101010101" charset="-122"/>
+                <a:ea typeface="仿宋" panose="02010609060101010101" charset="-122"/>
                 <a:hlinkClick r:id="rId3" action="ppaction://hlinkfile"/>
               </a:rPr>
-              <a:t>Rust in QEMU roadmap - Paolo Bonzini</a:t>
+              <a:t>From C to a Rust interface, brick by brick - Zhao Liu, Paolo Bonzini</a:t>
             </a:r>
             <a:endParaRPr lang="en-US" altLang="zh-CN" sz="1400" b="1">
               <a:latin typeface="仿宋" panose="02010609060101010101" charset="-122"/>
@@ -2898,7 +2913,7 @@
                 <a:latin typeface="仿宋" panose="02010609060101010101" charset="-122"/>
                 <a:ea typeface="仿宋" panose="02010609060101010101" charset="-122"/>
               </a:rPr>
-              <a:t>[2] </a:t>
+              <a:t>[3] </a:t>
             </a:r>
             <a:r>
               <a:rPr lang="en-US" altLang="zh-CN" sz="1400" b="1">
@@ -2906,33 +2921,6 @@
                 <a:ea typeface="仿宋" panose="02010609060101010101" charset="-122"/>
                 <a:hlinkClick r:id="rId4" action="ppaction://hlinkfile"/>
               </a:rPr>
-              <a:t>From C to a Rust interface, brick by brick - Zhao Liu, Paolo Bonzini</a:t>
-            </a:r>
-            <a:endParaRPr lang="en-US" altLang="zh-CN" sz="1400" b="1">
-              <a:latin typeface="仿宋" panose="02010609060101010101" charset="-122"/>
-              <a:ea typeface="仿宋" panose="02010609060101010101" charset="-122"/>
-              <a:hlinkClick r:id="rId4" action="ppaction://hlinkfile"/>
-            </a:endParaRPr>
-          </a:p>
-          <a:p>
-            <a:pPr>
-              <a:lnSpc>
-                <a:spcPct val="130000"/>
-              </a:lnSpc>
-            </a:pPr>
-            <a:r>
-              <a:rPr lang="en-US" altLang="zh-CN" sz="1400" b="1">
-                <a:latin typeface="仿宋" panose="02010609060101010101" charset="-122"/>
-                <a:ea typeface="仿宋" panose="02010609060101010101" charset="-122"/>
-              </a:rPr>
-              <a:t>[3] </a:t>
-            </a:r>
-            <a:r>
-              <a:rPr lang="en-US" altLang="zh-CN" sz="1400" b="1">
-                <a:latin typeface="仿宋" panose="02010609060101010101" charset="-122"/>
-                <a:ea typeface="仿宋" panose="02010609060101010101" charset="-122"/>
-                <a:hlinkClick r:id="rId5" action="ppaction://hlinkfile"/>
-              </a:rPr>
               <a:t>Rust in QEMU: strengths and challenges - Manos Pitsidianakis</a:t>
             </a:r>
             <a:r>
@@ -2949,6 +2937,28 @@
           </a:p>
         </p:txBody>
       </p:sp>
+      <p:pic>
+        <p:nvPicPr>
+          <p:cNvPr id="5" name="图片 4"/>
+          <p:cNvPicPr/>
+          <p:nvPr/>
+        </p:nvPicPr>
+        <p:blipFill>
+          <a:blip r:embed="rId5"/>
+          <a:stretch>
+            <a:fillRect/>
+          </a:stretch>
+        </p:blipFill>
+        <p:spPr>
+          <a:xfrm>
+            <a:off x="8681085" y="1790700"/>
+            <a:ext cx="3276600" cy="3276600"/>
+          </a:xfrm>
+          <a:prstGeom prst="rect">
+            <a:avLst/>
+          </a:prstGeom>
+        </p:spPr>
+      </p:pic>
     </p:spTree>
   </p:cSld>
   <p:clrMapOvr>

</xml_diff>